<commit_message>
bug fix van de leaflet draw
</commit_message>
<xml_diff>
--- a/presentaties/PresentatieSprint2.pptx
+++ b/presentaties/PresentatieSprint2.pptx
@@ -15,8 +15,8 @@
     <p:sldId id="270" r:id="rId6"/>
     <p:sldId id="267" r:id="rId7"/>
     <p:sldId id="268" r:id="rId8"/>
-    <p:sldId id="269" r:id="rId9"/>
-    <p:sldId id="264" r:id="rId10"/>
+    <p:sldId id="271" r:id="rId9"/>
+    <p:sldId id="269" r:id="rId10"/>
   </p:sldIdLst>
   <p:sldSz cx="17338675" cy="9753600"/>
   <p:notesSz cx="6858000" cy="9144000"/>
@@ -216,7 +216,7 @@
           <a:p>
             <a:fld id="{86680C0C-85DF-417F-8238-DB0D15743621}" type="datetimeFigureOut">
               <a:rPr lang="en-GB" smtClean="0"/>
-              <a:t>18/04/2019</a:t>
+              <a:t>23/04/2019</a:t>
             </a:fld>
             <a:endParaRPr lang="en-GB"/>
           </a:p>
@@ -602,7 +602,7 @@
           <a:p>
             <a:fld id="{5A24147F-ED97-47AF-A1B3-C82A179CF7F3}" type="datetime1">
               <a:rPr lang="nl-NL" smtClean="0"/>
-              <a:t>18-4-2019</a:t>
+              <a:t>23-4-2019</a:t>
             </a:fld>
             <a:endParaRPr lang="en-GB"/>
           </a:p>
@@ -1680,7 +1680,7 @@
           <a:p>
             <a:fld id="{25470885-0B31-4E06-AE71-7E16801F2838}" type="datetime1">
               <a:rPr lang="nl-BE" noProof="0" smtClean="0"/>
-              <a:t>18/04/2019</a:t>
+              <a:t>23/04/2019</a:t>
             </a:fld>
             <a:endParaRPr lang="nl-BE" noProof="0" dirty="0"/>
           </a:p>
@@ -1798,7 +1798,7 @@
           <a:p>
             <a:fld id="{E7410F60-8C93-4C37-B51A-4DDAE36F7E9B}" type="datetime1">
               <a:rPr lang="nl-BE" noProof="0" smtClean="0"/>
-              <a:t>18/04/2019</a:t>
+              <a:t>23/04/2019</a:t>
             </a:fld>
             <a:endParaRPr lang="nl-BE" noProof="0" dirty="0"/>
           </a:p>
@@ -2077,7 +2077,7 @@
           <a:p>
             <a:fld id="{656594B6-17DF-4759-A7A5-128AFEA77F2C}" type="datetime1">
               <a:rPr lang="nl-BE" noProof="0" smtClean="0"/>
-              <a:t>18/04/2019</a:t>
+              <a:t>23/04/2019</a:t>
             </a:fld>
             <a:endParaRPr lang="nl-BE" noProof="0" dirty="0"/>
           </a:p>
@@ -2218,7 +2218,7 @@
           <a:p>
             <a:fld id="{66A81384-1200-4D40-BEF0-3A17A1F906F4}" type="datetime1">
               <a:rPr lang="nl-NL" noProof="0" smtClean="0"/>
-              <a:t>18-4-2019</a:t>
+              <a:t>23-4-2019</a:t>
             </a:fld>
             <a:endParaRPr lang="nl-NL" noProof="0" dirty="0"/>
           </a:p>
@@ -2759,7 +2759,7 @@
           <a:p>
             <a:fld id="{FA870D1A-A3AB-4E9F-892E-C45B5A80FDBF}" type="datetime1">
               <a:rPr lang="nl-BE" noProof="0" smtClean="0"/>
-              <a:t>18/04/2019</a:t>
+              <a:t>23/04/2019</a:t>
             </a:fld>
             <a:endParaRPr lang="nl-BE" noProof="0" dirty="0"/>
           </a:p>
@@ -4136,8 +4136,12 @@
           <a:p>
             <a:pPr lvl="2"/>
             <a:r>
-              <a:rPr lang="nl-NL" dirty="0"/>
-              <a:t>Vliegpaden, obstakels, scan zones</a:t>
+              <a:rPr lang="nl-NL"/>
+              <a:t>Vliegroutes, obstakels en </a:t>
+            </a:r>
+            <a:r>
+              <a:rPr lang="nl-NL" dirty="0"/>
+              <a:t>scan zones</a:t>
             </a:r>
           </a:p>
           <a:p>
@@ -4400,7 +4404,7 @@
           <a:p>
             <a:r>
               <a:rPr lang="nl-NL" dirty="0"/>
-              <a:t>Vliegpaden valideren</a:t>
+              <a:t>Vliegroutes valideren</a:t>
             </a:r>
           </a:p>
         </p:txBody>
@@ -4451,7 +4455,7 @@
             <a:pPr lvl="2"/>
             <a:r>
               <a:rPr lang="nl-NL" dirty="0"/>
-              <a:t>corrigeren van onmogelijke paden door obstakels</a:t>
+              <a:t>corrigeren van onmogelijke routes door obstakels</a:t>
             </a:r>
           </a:p>
           <a:p>
@@ -4498,7 +4502,7 @@
     </p:spTree>
     <p:extLst>
       <p:ext uri="{BB962C8B-B14F-4D97-AF65-F5344CB8AC3E}">
-        <p14:creationId xmlns:p14="http://schemas.microsoft.com/office/powerpoint/2010/main" val="3841936152"/>
+        <p14:creationId xmlns:p14="http://schemas.microsoft.com/office/powerpoint/2010/main" val="3677996633"/>
       </p:ext>
     </p:extLst>
   </p:cSld>
@@ -4527,12 +4531,43 @@
       </p:grpSpPr>
       <p:sp>
         <p:nvSpPr>
-          <p:cNvPr id="4" name="Tijdelijke aanduiding voor tekst 3"/>
-          <p:cNvSpPr>
-            <a:spLocks noGrp="1"/>
-          </p:cNvSpPr>
-          <p:nvPr>
-            <p:ph type="body" sz="quarter" idx="10"/>
+          <p:cNvPr id="2" name="Titel 1"/>
+          <p:cNvSpPr>
+            <a:spLocks noGrp="1"/>
+          </p:cNvSpPr>
+          <p:nvPr>
+            <p:ph type="title"/>
+          </p:nvPr>
+        </p:nvSpPr>
+        <p:spPr>
+          <a:xfrm>
+            <a:off x="830118" y="136025"/>
+            <a:ext cx="15705282" cy="863693"/>
+          </a:xfrm>
+        </p:spPr>
+        <p:txBody>
+          <a:bodyPr/>
+          <a:lstStyle/>
+          <a:p>
+            <a:r>
+              <a:rPr lang="nl-NL" dirty="0" err="1"/>
+              <a:t>Mockup</a:t>
+            </a:r>
+            <a:r>
+              <a:rPr lang="nl-NL" dirty="0"/>
+              <a:t> Drone</a:t>
+            </a:r>
+          </a:p>
+        </p:txBody>
+      </p:sp>
+      <p:sp>
+        <p:nvSpPr>
+          <p:cNvPr id="3" name="Tijdelijke aanduiding voor inhoud 2"/>
+          <p:cNvSpPr>
+            <a:spLocks noGrp="1"/>
+          </p:cNvSpPr>
+          <p:nvPr>
+            <p:ph idx="1"/>
           </p:nvPr>
         </p:nvSpPr>
         <p:spPr/>
@@ -4542,53 +4577,50 @@
           </a:bodyPr>
           <a:lstStyle/>
           <a:p>
-            <a:pPr marL="85725" indent="0">
-              <a:buNone/>
-            </a:pPr>
-            <a:r>
-              <a:rPr lang="nl-NL" sz="2400" dirty="0" err="1"/>
-              <a:t>Ghent</a:t>
-            </a:r>
-            <a:r>
-              <a:rPr lang="nl-NL" sz="2400" dirty="0"/>
-              <a:t> University</a:t>
-            </a:r>
-            <a:br>
-              <a:rPr lang="nl-NL" sz="2400" dirty="0"/>
-            </a:br>
-            <a:r>
-              <a:rPr lang="nl-NL" sz="2400" dirty="0"/>
-              <a:t>@</a:t>
-            </a:r>
-            <a:r>
-              <a:rPr lang="nl-NL" sz="2400" dirty="0" err="1"/>
-              <a:t>ugent</a:t>
-            </a:r>
-            <a:br>
-              <a:rPr lang="nl-NL" sz="2400" dirty="0"/>
-            </a:br>
-            <a:r>
-              <a:rPr lang="nl-NL" sz="2400" dirty="0" err="1"/>
-              <a:t>Ghent</a:t>
-            </a:r>
-            <a:r>
-              <a:rPr lang="nl-NL" sz="2400" dirty="0"/>
-              <a:t> University</a:t>
+            <a:r>
+              <a:rPr lang="nl-NL" dirty="0"/>
+              <a:t>Ontvangen van commando signalen	</a:t>
+            </a:r>
+          </a:p>
+          <a:p>
+            <a:pPr lvl="1"/>
+            <a:r>
+              <a:rPr lang="nl-NL" dirty="0"/>
+              <a:t>Start, stop, pauze</a:t>
+            </a:r>
+          </a:p>
+          <a:p>
+            <a:pPr lvl="1"/>
+            <a:r>
+              <a:rPr lang="nl-NL" dirty="0"/>
+              <a:t>Vliegen naar een coördinaat</a:t>
+            </a:r>
+          </a:p>
+          <a:p>
+            <a:r>
+              <a:rPr lang="nl-NL" dirty="0"/>
+              <a:t>Versturen van gegenereerde data</a:t>
             </a:r>
           </a:p>
           <a:p>
             <a:endParaRPr lang="nl-NL" dirty="0"/>
           </a:p>
-        </p:txBody>
-      </p:sp>
-      <p:sp>
-        <p:nvSpPr>
-          <p:cNvPr id="2" name="Title 1"/>
-          <p:cNvSpPr>
-            <a:spLocks noGrp="1"/>
-          </p:cNvSpPr>
-          <p:nvPr>
-            <p:ph type="ctrTitle"/>
+          <a:p>
+            <a:endParaRPr lang="nl-NL" dirty="0"/>
+          </a:p>
+          <a:p>
+            <a:endParaRPr lang="nl-NL" dirty="0"/>
+          </a:p>
+        </p:txBody>
+      </p:sp>
+      <p:sp>
+        <p:nvSpPr>
+          <p:cNvPr id="4" name="Tijdelijke aanduiding voor dianummer 3"/>
+          <p:cNvSpPr>
+            <a:spLocks noGrp="1"/>
+          </p:cNvSpPr>
+          <p:nvPr>
+            <p:ph type="sldNum" sz="quarter" idx="12"/>
           </p:nvPr>
         </p:nvSpPr>
         <p:spPr/>
@@ -4596,165 +4628,18 @@
           <a:bodyPr/>
           <a:lstStyle/>
           <a:p>
-            <a:r>
-              <a:rPr lang="nl-BE" sz="3500" dirty="0"/>
-              <a:t>&lt; naam presentator &gt;</a:t>
-            </a:r>
-            <a:br>
-              <a:rPr lang="nl-BE" dirty="0"/>
-            </a:br>
-            <a:r>
-              <a:rPr lang="nl-BE" dirty="0"/>
-              <a:t>&lt; functie &gt;</a:t>
-            </a:r>
-            <a:br>
-              <a:rPr lang="nl-BE" dirty="0"/>
-            </a:br>
-            <a:br>
-              <a:rPr lang="nl-BE" dirty="0"/>
-            </a:br>
-            <a:r>
-              <a:rPr lang="nl-BE" cap="all" dirty="0"/>
-              <a:t>&lt; directie, afdeling of dienst &gt;</a:t>
-            </a:r>
-            <a:br>
-              <a:rPr lang="nl-BE" cap="all" dirty="0"/>
-            </a:br>
-            <a:br>
-              <a:rPr lang="nl-BE" dirty="0"/>
-            </a:br>
-            <a:r>
-              <a:rPr lang="nl-BE" dirty="0"/>
-              <a:t>E	&lt;voornaam&gt;.&lt;achternaam&gt;@ugent.be</a:t>
-            </a:r>
-            <a:br>
-              <a:rPr lang="nl-BE" dirty="0"/>
-            </a:br>
-            <a:r>
-              <a:rPr lang="nl-BE" dirty="0"/>
-              <a:t>T	+32 9 000 00 00</a:t>
-            </a:r>
-            <a:br>
-              <a:rPr lang="nl-BE" dirty="0"/>
-            </a:br>
-            <a:r>
-              <a:rPr lang="nl-BE" dirty="0"/>
-              <a:t>M	+32 400 00 00 00</a:t>
-            </a:r>
-            <a:br>
-              <a:rPr lang="nl-BE" dirty="0"/>
-            </a:br>
-            <a:br>
-              <a:rPr lang="nl-BE" dirty="0"/>
-            </a:br>
-            <a:r>
-              <a:rPr lang="nl-BE" dirty="0"/>
-              <a:t>www.ugent.be</a:t>
-            </a:r>
-            <a:br>
-              <a:rPr lang="nl-BE" dirty="0"/>
-            </a:br>
-            <a:br>
-              <a:rPr lang="nl-BE" dirty="0"/>
-            </a:br>
-            <a:endParaRPr lang="nl-BE" dirty="0"/>
-          </a:p>
-        </p:txBody>
-      </p:sp>
-      <p:pic>
-        <p:nvPicPr>
-          <p:cNvPr id="5" name="Picture 9"/>
-          <p:cNvPicPr>
-            <a:picLocks noChangeAspect="1"/>
-          </p:cNvPicPr>
-          <p:nvPr/>
-        </p:nvPicPr>
-        <p:blipFill>
-          <a:blip r:embed="rId2" cstate="print">
-            <a:extLst>
-              <a:ext uri="{28A0092B-C50C-407E-A947-70E740481C1C}">
-                <a14:useLocalDpi xmlns:a14="http://schemas.microsoft.com/office/drawing/2010/main" val="0"/>
-              </a:ext>
-            </a:extLst>
-          </a:blip>
-          <a:stretch>
-            <a:fillRect/>
-          </a:stretch>
-        </p:blipFill>
-        <p:spPr>
-          <a:xfrm>
-            <a:off x="8710619" y="3175459"/>
-            <a:ext cx="280417" cy="335281"/>
-          </a:xfrm>
-          <a:prstGeom prst="rect">
-            <a:avLst/>
-          </a:prstGeom>
-        </p:spPr>
-      </p:pic>
-      <p:pic>
-        <p:nvPicPr>
-          <p:cNvPr id="6" name="Picture 10"/>
-          <p:cNvPicPr>
-            <a:picLocks noChangeAspect="1"/>
-          </p:cNvPicPr>
-          <p:nvPr/>
-        </p:nvPicPr>
-        <p:blipFill>
-          <a:blip r:embed="rId3" cstate="print">
-            <a:extLst>
-              <a:ext uri="{28A0092B-C50C-407E-A947-70E740481C1C}">
-                <a14:useLocalDpi xmlns:a14="http://schemas.microsoft.com/office/drawing/2010/main" val="0"/>
-              </a:ext>
-            </a:extLst>
-          </a:blip>
-          <a:stretch>
-            <a:fillRect/>
-          </a:stretch>
-        </p:blipFill>
-        <p:spPr>
-          <a:xfrm>
-            <a:off x="8710618" y="3592583"/>
-            <a:ext cx="280417" cy="356617"/>
-          </a:xfrm>
-          <a:prstGeom prst="rect">
-            <a:avLst/>
-          </a:prstGeom>
-        </p:spPr>
-      </p:pic>
-      <p:pic>
-        <p:nvPicPr>
-          <p:cNvPr id="7" name="Picture 11"/>
-          <p:cNvPicPr>
-            <a:picLocks noChangeAspect="1"/>
-          </p:cNvPicPr>
-          <p:nvPr/>
-        </p:nvPicPr>
-        <p:blipFill>
-          <a:blip r:embed="rId4" cstate="print">
-            <a:extLst>
-              <a:ext uri="{28A0092B-C50C-407E-A947-70E740481C1C}">
-                <a14:useLocalDpi xmlns:a14="http://schemas.microsoft.com/office/drawing/2010/main" val="0"/>
-              </a:ext>
-            </a:extLst>
-          </a:blip>
-          <a:stretch>
-            <a:fillRect/>
-          </a:stretch>
-        </p:blipFill>
-        <p:spPr>
-          <a:xfrm>
-            <a:off x="8710619" y="4117291"/>
-            <a:ext cx="280417" cy="280417"/>
-          </a:xfrm>
-          <a:prstGeom prst="rect">
-            <a:avLst/>
-          </a:prstGeom>
-        </p:spPr>
-      </p:pic>
+            <a:fld id="{7AE184E0-0BD4-4705-A12B-9B71DDE63301}" type="slidenum">
+              <a:rPr lang="nl-BE" noProof="0" smtClean="0"/>
+              <a:t>9</a:t>
+            </a:fld>
+            <a:endParaRPr lang="nl-BE" noProof="0" dirty="0"/>
+          </a:p>
+        </p:txBody>
+      </p:sp>
     </p:spTree>
     <p:extLst>
       <p:ext uri="{BB962C8B-B14F-4D97-AF65-F5344CB8AC3E}">
-        <p14:creationId xmlns:p14="http://schemas.microsoft.com/office/powerpoint/2010/main" val="411963799"/>
+        <p14:creationId xmlns:p14="http://schemas.microsoft.com/office/powerpoint/2010/main" val="3841936152"/>
       </p:ext>
     </p:extLst>
   </p:cSld>

</xml_diff>

<commit_message>
flightpath reset bij stop knop
</commit_message>
<xml_diff>
--- a/presentaties/PresentatieSprint2.pptx
+++ b/presentaties/PresentatieSprint2.pptx
@@ -3606,7 +3606,17 @@
             </a:r>
             <a:r>
               <a:rPr lang="nl-NL" dirty="0"/>
-              <a:t>: sprint 2 (gerealiseerd)</a:t>
+              <a:t>: sprint 2 (gerealiseerd </a:t>
+            </a:r>
+            <a:r>
+              <a:rPr lang="nl-NL" dirty="0">
+                <a:sym typeface="Wingdings" panose="05000000000000000000" pitchFamily="2" charset="2"/>
+              </a:rPr>
+              <a:t>💪</a:t>
+            </a:r>
+            <a:r>
+              <a:rPr lang="nl-NL" dirty="0"/>
+              <a:t>)</a:t>
             </a:r>
           </a:p>
         </p:txBody>
@@ -3750,12 +3760,12 @@
           <a:lstStyle/>
           <a:p>
             <a:r>
-              <a:rPr lang="nl-NL" dirty="0" err="1"/>
+              <a:rPr lang="nl-NL" sz="4800" dirty="0" err="1"/>
               <a:t>Backlog</a:t>
             </a:r>
             <a:r>
-              <a:rPr lang="nl-NL" dirty="0"/>
-              <a:t>: sprint 2 (niet gerealiseerd)</a:t>
+              <a:rPr lang="nl-NL" sz="4800" dirty="0"/>
+              <a:t>: sprint 2 (niet gerealiseerd 😢)</a:t>
             </a:r>
           </a:p>
         </p:txBody>
@@ -4136,12 +4146,8 @@
           <a:p>
             <a:pPr lvl="2"/>
             <a:r>
-              <a:rPr lang="nl-NL"/>
-              <a:t>Vliegroutes, obstakels en </a:t>
-            </a:r>
-            <a:r>
-              <a:rPr lang="nl-NL" dirty="0"/>
-              <a:t>scan zones</a:t>
+              <a:rPr lang="nl-NL" dirty="0"/>
+              <a:t>Vliegroutes, obstakels en scan zones</a:t>
             </a:r>
           </a:p>
           <a:p>

</xml_diff>

<commit_message>
Fix products + docker update
</commit_message>
<xml_diff>
--- a/presentaties/PresentatieSprint2.pptx
+++ b/presentaties/PresentatieSprint2.pptx
@@ -219,7 +219,7 @@
           <a:p>
             <a:fld id="{86680C0C-85DF-417F-8238-DB0D15743621}" type="datetimeFigureOut">
               <a:rPr lang="en-GB" smtClean="0"/>
-              <a:t>23/04/2019</a:t>
+              <a:t>24/04/2019</a:t>
             </a:fld>
             <a:endParaRPr lang="en-GB"/>
           </a:p>
@@ -699,7 +699,7 @@
           <a:p>
             <a:fld id="{5A24147F-ED97-47AF-A1B3-C82A179CF7F3}" type="datetime1">
               <a:rPr lang="nl-NL" smtClean="0"/>
-              <a:t>23-4-2019</a:t>
+              <a:t>24-4-2019</a:t>
             </a:fld>
             <a:endParaRPr lang="en-GB"/>
           </a:p>
@@ -1777,7 +1777,7 @@
           <a:p>
             <a:fld id="{25470885-0B31-4E06-AE71-7E16801F2838}" type="datetime1">
               <a:rPr lang="nl-BE" noProof="0" smtClean="0"/>
-              <a:t>23/04/2019</a:t>
+              <a:t>24/04/2019</a:t>
             </a:fld>
             <a:endParaRPr lang="nl-BE" noProof="0" dirty="0"/>
           </a:p>
@@ -1895,7 +1895,7 @@
           <a:p>
             <a:fld id="{E7410F60-8C93-4C37-B51A-4DDAE36F7E9B}" type="datetime1">
               <a:rPr lang="nl-BE" noProof="0" smtClean="0"/>
-              <a:t>23/04/2019</a:t>
+              <a:t>24/04/2019</a:t>
             </a:fld>
             <a:endParaRPr lang="nl-BE" noProof="0" dirty="0"/>
           </a:p>
@@ -2174,7 +2174,7 @@
           <a:p>
             <a:fld id="{656594B6-17DF-4759-A7A5-128AFEA77F2C}" type="datetime1">
               <a:rPr lang="nl-BE" noProof="0" smtClean="0"/>
-              <a:t>23/04/2019</a:t>
+              <a:t>24/04/2019</a:t>
             </a:fld>
             <a:endParaRPr lang="nl-BE" noProof="0" dirty="0"/>
           </a:p>
@@ -2315,7 +2315,7 @@
           <a:p>
             <a:fld id="{66A81384-1200-4D40-BEF0-3A17A1F906F4}" type="datetime1">
               <a:rPr lang="nl-NL" noProof="0" smtClean="0"/>
-              <a:t>23-4-2019</a:t>
+              <a:t>24-4-2019</a:t>
             </a:fld>
             <a:endParaRPr lang="nl-NL" noProof="0" dirty="0"/>
           </a:p>
@@ -2856,7 +2856,7 @@
           <a:p>
             <a:fld id="{FA870D1A-A3AB-4E9F-892E-C45B5A80FDBF}" type="datetime1">
               <a:rPr lang="nl-BE" noProof="0" smtClean="0"/>
-              <a:t>23/04/2019</a:t>
+              <a:t>24/04/2019</a:t>
             </a:fld>
             <a:endParaRPr lang="nl-BE" noProof="0" dirty="0"/>
           </a:p>
@@ -4484,8 +4484,20 @@
             <a:pPr lvl="1"/>
             <a:r>
               <a:rPr lang="nl-NL" dirty="0"/>
-              <a:t>Ankerpunten</a:t>
-            </a:r>
+              <a:t>Ankerpunten </a:t>
+            </a:r>
+          </a:p>
+          <a:p>
+            <a:pPr marL="1305676" lvl="2" indent="0">
+              <a:buNone/>
+            </a:pPr>
+            <a:r>
+              <a:rPr lang="nl-NL" dirty="0">
+                <a:sym typeface="Wingdings" panose="05000000000000000000" pitchFamily="2" charset="2"/>
+              </a:rPr>
+              <a:t> verhouding pixels  coördinatenstelsel bepalen</a:t>
+            </a:r>
+            <a:endParaRPr lang="nl-NL" dirty="0"/>
           </a:p>
           <a:p>
             <a:endParaRPr lang="nl-NL" dirty="0"/>
@@ -4906,7 +4918,12 @@
             <p:ph idx="1"/>
           </p:nvPr>
         </p:nvSpPr>
-        <p:spPr/>
+        <p:spPr>
+          <a:xfrm>
+            <a:off x="835825" y="1194364"/>
+            <a:ext cx="15699575" cy="7342807"/>
+          </a:xfrm>
+        </p:spPr>
         <p:txBody>
           <a:bodyPr>
             <a:normAutofit fontScale="70000" lnSpcReduction="20000"/>
@@ -5055,6 +5072,14 @@
               <a:rPr lang="nl-NL" dirty="0"/>
               <a:t>Live visualisatie van de drone (positie, oriëntatie/richting)</a:t>
             </a:r>
+          </a:p>
+          <a:p>
+            <a:pPr lvl="1"/>
+            <a:r>
+              <a:rPr lang="nl-NL" dirty="0" err="1"/>
+              <a:t>GeoJSON</a:t>
+            </a:r>
+            <a:endParaRPr lang="nl-NL" dirty="0"/>
           </a:p>
           <a:p>
             <a:endParaRPr lang="nl-NL" dirty="0"/>

</xml_diff>